<commit_message>
Update materials for pre pre defense part 3
</commit_message>
<xml_diff>
--- a/presentation_materials/summer-report 2022/Pogrebnoy D A - presentation.pptx
+++ b/presentation_materials/summer-report 2022/Pogrebnoy D A - presentation.pptx
@@ -224,7 +224,7 @@
             <a:fld id="{19412975-4CFD-C441-A244-B7FD9A9579C2}" type="datetimeFigureOut">
               <a:rPr lang="en-US" smtClean="0"/>
               <a:pPr/>
-              <a:t>6/24/2022</a:t>
+              <a:t>4/17/2023</a:t>
             </a:fld>
             <a:endParaRPr lang="en-US"/>
           </a:p>
@@ -392,7 +392,7 @@
             <a:fld id="{6DAFD1C8-470D-774F-8B40-381C3059BD4A}" type="datetimeFigureOut">
               <a:rPr lang="en-US" smtClean="0"/>
               <a:pPr/>
-              <a:t>6/24/2022</a:t>
+              <a:t>4/17/2023</a:t>
             </a:fld>
             <a:endParaRPr lang="en-US"/>
           </a:p>
@@ -5798,13 +5798,7 @@
               <a:rPr lang="en-US" dirty="0" smtClean="0">
                 <a:latin typeface="Montserrat" panose="00000500000000000000" pitchFamily="2" charset="-52"/>
               </a:rPr>
-              <a:t>upervisor</a:t>
-            </a:r>
-            <a:r>
-              <a:rPr lang="en-US" dirty="0" smtClean="0">
-                <a:latin typeface="Montserrat" panose="00000500000000000000" pitchFamily="2" charset="-52"/>
-              </a:rPr>
-              <a:t>: </a:t>
+              <a:t>upervisor: </a:t>
             </a:r>
             <a:r>
               <a:rPr lang="en-US" dirty="0">

</xml_diff>